<commit_message>
passe sur la relecture de thierry de w4
</commit_message>
<xml_diff>
--- a/w4/w4-s2-av-slide1.pptx
+++ b/w4/w4-s2-av-slide1.pptx
@@ -5,19 +5,21 @@
     <p:sldMasterId id="2147483649" r:id="rId1"/>
   </p:sldMasterIdLst>
   <p:notesMasterIdLst>
-    <p:notesMasterId r:id="rId9"/>
+    <p:notesMasterId r:id="rId11"/>
   </p:notesMasterIdLst>
   <p:handoutMasterIdLst>
-    <p:handoutMasterId r:id="rId10"/>
+    <p:handoutMasterId r:id="rId12"/>
   </p:handoutMasterIdLst>
   <p:sldIdLst>
     <p:sldId id="257" r:id="rId2"/>
-    <p:sldId id="262" r:id="rId3"/>
-    <p:sldId id="266" r:id="rId4"/>
-    <p:sldId id="264" r:id="rId5"/>
-    <p:sldId id="265" r:id="rId6"/>
-    <p:sldId id="267" r:id="rId7"/>
-    <p:sldId id="269" r:id="rId8"/>
+    <p:sldId id="270" r:id="rId3"/>
+    <p:sldId id="264" r:id="rId4"/>
+    <p:sldId id="262" r:id="rId5"/>
+    <p:sldId id="266" r:id="rId6"/>
+    <p:sldId id="265" r:id="rId7"/>
+    <p:sldId id="267" r:id="rId8"/>
+    <p:sldId id="269" r:id="rId9"/>
+    <p:sldId id="271" r:id="rId10"/>
   </p:sldIdLst>
   <p:sldSz cx="12192000" cy="6858000"/>
   <p:notesSz cx="7099300" cy="10234613"/>
@@ -152,12 +154,14 @@
         <p14:section name="Section par défaut" id="{28C650F0-13B2-49C9-9ED4-D40CD07835D6}">
           <p14:sldIdLst>
             <p14:sldId id="257"/>
+            <p14:sldId id="270"/>
+            <p14:sldId id="264"/>
             <p14:sldId id="262"/>
             <p14:sldId id="266"/>
-            <p14:sldId id="264"/>
             <p14:sldId id="265"/>
             <p14:sldId id="267"/>
             <p14:sldId id="269"/>
+            <p14:sldId id="271"/>
           </p14:sldIdLst>
         </p14:section>
       </p14:sectionLst>
@@ -589,7 +593,7 @@
           </a:ln>
           <a:extLst>
             <a:ext uri="{909E8E84-426E-40dd-AFC4-6F175D3DCCD1}">
-              <a14:hiddenFill xmlns="" xmlns:a14="http://schemas.microsoft.com/office/drawing/2010/main">
+              <a14:hiddenFill xmlns:a14="http://schemas.microsoft.com/office/drawing/2010/main" xmlns="">
                 <a:solidFill>
                   <a:srgbClr val="FFFFFF"/>
                 </a:solidFill>
@@ -1143,7 +1147,7 @@
     </p:spTree>
     <p:extLst>
       <p:ext uri="{BB962C8B-B14F-4D97-AF65-F5344CB8AC3E}">
-        <p14:creationId xmlns:p14="http://schemas.microsoft.com/office/powerpoint/2010/main" val="109180405"/>
+        <p14:creationId xmlns:p14="http://schemas.microsoft.com/office/powerpoint/2010/main" val="1055214281"/>
       </p:ext>
     </p:extLst>
   </p:cSld>
@@ -1202,6 +1206,30 @@
           <a:bodyPr/>
           <a:lstStyle/>
           <a:p>
+            <a:r>
+              <a:rPr lang="fr-FR" dirty="0" smtClean="0"/>
+              <a:t>Test surprenant, mais les</a:t>
+            </a:r>
+            <a:r>
+              <a:rPr lang="fr-FR" baseline="0" dirty="0" smtClean="0"/>
+              <a:t> types </a:t>
+            </a:r>
+            <a:r>
+              <a:rPr lang="fr-FR" baseline="0" dirty="0" err="1" smtClean="0"/>
+              <a:t>built</a:t>
+            </a:r>
+            <a:r>
+              <a:rPr lang="fr-FR" baseline="0" dirty="0" smtClean="0"/>
+              <a:t>-in peuvent toujours être évalué à </a:t>
+            </a:r>
+            <a:r>
+              <a:rPr lang="fr-FR" baseline="0" dirty="0" err="1" smtClean="0"/>
+              <a:t>True</a:t>
+            </a:r>
+            <a:r>
+              <a:rPr lang="fr-FR" baseline="0" dirty="0" smtClean="0"/>
+              <a:t> ou False dans un test de if</a:t>
+            </a:r>
             <a:endParaRPr lang="fr-FR" dirty="0"/>
           </a:p>
         </p:txBody>
@@ -1238,7 +1266,7 @@
     </p:spTree>
     <p:extLst>
       <p:ext uri="{BB962C8B-B14F-4D97-AF65-F5344CB8AC3E}">
-        <p14:creationId xmlns:p14="http://schemas.microsoft.com/office/powerpoint/2010/main" val="2664251964"/>
+        <p14:creationId xmlns:p14="http://schemas.microsoft.com/office/powerpoint/2010/main" val="1498679125"/>
       </p:ext>
     </p:extLst>
   </p:cSld>
@@ -1299,27 +1327,7 @@
           <a:p>
             <a:r>
               <a:rPr lang="fr-FR" dirty="0" smtClean="0"/>
-              <a:t>Test surprenant, mais les</a:t>
-            </a:r>
-            <a:r>
-              <a:rPr lang="fr-FR" baseline="0" dirty="0" smtClean="0"/>
-              <a:t> types </a:t>
-            </a:r>
-            <a:r>
-              <a:rPr lang="fr-FR" baseline="0" dirty="0" err="1" smtClean="0"/>
-              <a:t>built</a:t>
-            </a:r>
-            <a:r>
-              <a:rPr lang="fr-FR" baseline="0" dirty="0" smtClean="0"/>
-              <a:t>-in peuvent toujours être évalué à </a:t>
-            </a:r>
-            <a:r>
-              <a:rPr lang="fr-FR" baseline="0" dirty="0" err="1" smtClean="0"/>
-              <a:t>True</a:t>
-            </a:r>
-            <a:r>
-              <a:rPr lang="fr-FR" baseline="0" dirty="0" smtClean="0"/>
-              <a:t> ou False dans un test de if</a:t>
+              <a:t>Test classique</a:t>
             </a:r>
             <a:endParaRPr lang="fr-FR" dirty="0"/>
           </a:p>
@@ -1357,7 +1365,7 @@
     </p:spTree>
     <p:extLst>
       <p:ext uri="{BB962C8B-B14F-4D97-AF65-F5344CB8AC3E}">
-        <p14:creationId xmlns:p14="http://schemas.microsoft.com/office/powerpoint/2010/main" val="1498679125"/>
+        <p14:creationId xmlns:p14="http://schemas.microsoft.com/office/powerpoint/2010/main" val="109180405"/>
       </p:ext>
     </p:extLst>
   </p:cSld>
@@ -1452,7 +1460,7 @@
     </p:spTree>
     <p:extLst>
       <p:ext uri="{BB962C8B-B14F-4D97-AF65-F5344CB8AC3E}">
-        <p14:creationId xmlns:p14="http://schemas.microsoft.com/office/powerpoint/2010/main" val="2874170801"/>
+        <p14:creationId xmlns:p14="http://schemas.microsoft.com/office/powerpoint/2010/main" val="2664251964"/>
       </p:ext>
     </p:extLst>
   </p:cSld>
@@ -1511,24 +1519,6 @@
           <a:bodyPr/>
           <a:lstStyle/>
           <a:p>
-            <a:r>
-              <a:rPr lang="fr-FR" dirty="0" smtClean="0"/>
-              <a:t>Regardons</a:t>
-            </a:r>
-            <a:r>
-              <a:rPr lang="fr-FR" baseline="0" dirty="0" smtClean="0"/>
-              <a:t> un peu plus en détail les test booléens</a:t>
-            </a:r>
-          </a:p>
-          <a:p>
-            <a:r>
-              <a:rPr lang="fr-FR" baseline="0" dirty="0" smtClean="0"/>
-              <a:t>A et B sont n’importe </a:t>
-            </a:r>
-            <a:r>
-              <a:rPr lang="fr-FR" baseline="0" smtClean="0"/>
-              <a:t>quel objet. </a:t>
-            </a:r>
             <a:endParaRPr lang="fr-FR" dirty="0"/>
           </a:p>
         </p:txBody>
@@ -1565,7 +1555,7 @@
     </p:spTree>
     <p:extLst>
       <p:ext uri="{BB962C8B-B14F-4D97-AF65-F5344CB8AC3E}">
-        <p14:creationId xmlns:p14="http://schemas.microsoft.com/office/powerpoint/2010/main" val="3547688461"/>
+        <p14:creationId xmlns:p14="http://schemas.microsoft.com/office/powerpoint/2010/main" val="2874170801"/>
       </p:ext>
     </p:extLst>
   </p:cSld>
@@ -1624,7 +1614,25 @@
           <a:bodyPr/>
           <a:lstStyle/>
           <a:p>
-            <a:endParaRPr lang="fr-FR" dirty="0" smtClean="0"/>
+            <a:r>
+              <a:rPr lang="fr-FR" dirty="0" smtClean="0"/>
+              <a:t>Regardons</a:t>
+            </a:r>
+            <a:r>
+              <a:rPr lang="fr-FR" baseline="0" dirty="0" smtClean="0"/>
+              <a:t> un peu plus en détail les test booléens</a:t>
+            </a:r>
+          </a:p>
+          <a:p>
+            <a:r>
+              <a:rPr lang="fr-FR" baseline="0" dirty="0" smtClean="0"/>
+              <a:t>A et B sont n’importe </a:t>
+            </a:r>
+            <a:r>
+              <a:rPr lang="fr-FR" baseline="0" smtClean="0"/>
+              <a:t>quel objet. </a:t>
+            </a:r>
+            <a:endParaRPr lang="fr-FR" dirty="0"/>
           </a:p>
         </p:txBody>
       </p:sp>
@@ -1652,6 +1660,101 @@
                 <a:defRPr/>
               </a:pPr>
               <a:t>7</a:t>
+            </a:fld>
+            <a:endParaRPr lang="en-US"/>
+          </a:p>
+        </p:txBody>
+      </p:sp>
+    </p:spTree>
+    <p:extLst>
+      <p:ext uri="{BB962C8B-B14F-4D97-AF65-F5344CB8AC3E}">
+        <p14:creationId xmlns:p14="http://schemas.microsoft.com/office/powerpoint/2010/main" val="3547688461"/>
+      </p:ext>
+    </p:extLst>
+  </p:cSld>
+  <p:clrMapOvr>
+    <a:masterClrMapping/>
+  </p:clrMapOvr>
+</p:notes>
+</file>
+
+<file path=ppt/notesSlides/notesSlide8.xml><?xml version="1.0" encoding="utf-8"?>
+<p:notes xmlns:a="http://schemas.openxmlformats.org/drawingml/2006/main" xmlns:r="http://schemas.openxmlformats.org/officeDocument/2006/relationships" xmlns:p="http://schemas.openxmlformats.org/presentationml/2006/main">
+  <p:cSld>
+    <p:spTree>
+      <p:nvGrpSpPr>
+        <p:cNvPr id="1" name=""/>
+        <p:cNvGrpSpPr/>
+        <p:nvPr/>
+      </p:nvGrpSpPr>
+      <p:grpSpPr>
+        <a:xfrm>
+          <a:off x="0" y="0"/>
+          <a:ext cx="0" cy="0"/>
+          <a:chOff x="0" y="0"/>
+          <a:chExt cx="0" cy="0"/>
+        </a:xfrm>
+      </p:grpSpPr>
+      <p:sp>
+        <p:nvSpPr>
+          <p:cNvPr id="2" name="Espace réservé de l'image des diapositives 1"/>
+          <p:cNvSpPr>
+            <a:spLocks noGrp="1" noRot="1" noChangeAspect="1"/>
+          </p:cNvSpPr>
+          <p:nvPr>
+            <p:ph type="sldImg"/>
+          </p:nvPr>
+        </p:nvSpPr>
+        <p:spPr>
+          <a:xfrm>
+            <a:off x="141288" y="768350"/>
+            <a:ext cx="6818312" cy="3836988"/>
+          </a:xfrm>
+        </p:spPr>
+      </p:sp>
+      <p:sp>
+        <p:nvSpPr>
+          <p:cNvPr id="3" name="Espace réservé des commentaires 2"/>
+          <p:cNvSpPr>
+            <a:spLocks noGrp="1"/>
+          </p:cNvSpPr>
+          <p:nvPr>
+            <p:ph type="body" idx="1"/>
+          </p:nvPr>
+        </p:nvSpPr>
+        <p:spPr/>
+        <p:txBody>
+          <a:bodyPr/>
+          <a:lstStyle/>
+          <a:p>
+            <a:endParaRPr lang="fr-FR" dirty="0" smtClean="0"/>
+          </a:p>
+        </p:txBody>
+      </p:sp>
+      <p:sp>
+        <p:nvSpPr>
+          <p:cNvPr id="4" name="Espace réservé du numéro de diapositive 3"/>
+          <p:cNvSpPr>
+            <a:spLocks noGrp="1"/>
+          </p:cNvSpPr>
+          <p:nvPr>
+            <p:ph type="sldNum" sz="quarter" idx="10"/>
+          </p:nvPr>
+        </p:nvSpPr>
+        <p:spPr/>
+        <p:txBody>
+          <a:bodyPr/>
+          <a:lstStyle/>
+          <a:p>
+            <a:pPr>
+              <a:defRPr/>
+            </a:pPr>
+            <a:fld id="{9E8EB9F5-F2F7-4A48-A943-9B409357C15C}" type="slidenum">
+              <a:rPr lang="en-US" smtClean="0"/>
+              <a:pPr>
+                <a:defRPr/>
+              </a:pPr>
+              <a:t>8</a:t>
             </a:fld>
             <a:endParaRPr lang="en-US"/>
           </a:p>
@@ -4361,14 +4464,14 @@
           </a:ln>
           <a:extLst>
             <a:ext uri="{909E8E84-426E-40dd-AFC4-6F175D3DCCD1}">
-              <a14:hiddenFill xmlns="" xmlns:a14="http://schemas.microsoft.com/office/drawing/2010/main">
+              <a14:hiddenFill xmlns:a14="http://schemas.microsoft.com/office/drawing/2010/main" xmlns="">
                 <a:solidFill>
                   <a:srgbClr val="FFFFFF"/>
                 </a:solidFill>
               </a14:hiddenFill>
             </a:ext>
             <a:ext uri="{91240B29-F687-4f45-9708-019B960494DF}">
-              <a14:hiddenLine xmlns="" xmlns:a14="http://schemas.microsoft.com/office/drawing/2010/main" w="9525">
+              <a14:hiddenLine xmlns:a14="http://schemas.microsoft.com/office/drawing/2010/main" xmlns="" w="9525">
                 <a:solidFill>
                   <a:srgbClr val="000000"/>
                 </a:solidFill>
@@ -4419,14 +4522,14 @@
           </a:ln>
           <a:extLst>
             <a:ext uri="{909E8E84-426E-40dd-AFC4-6F175D3DCCD1}">
-              <a14:hiddenFill xmlns="" xmlns:a14="http://schemas.microsoft.com/office/drawing/2010/main">
+              <a14:hiddenFill xmlns:a14="http://schemas.microsoft.com/office/drawing/2010/main" xmlns="">
                 <a:solidFill>
                   <a:srgbClr val="FFFFFF"/>
                 </a:solidFill>
               </a14:hiddenFill>
             </a:ext>
             <a:ext uri="{91240B29-F687-4f45-9708-019B960494DF}">
-              <a14:hiddenLine xmlns="" xmlns:a14="http://schemas.microsoft.com/office/drawing/2010/main" w="9525">
+              <a14:hiddenLine xmlns:a14="http://schemas.microsoft.com/office/drawing/2010/main" xmlns="" w="9525">
                 <a:solidFill>
                   <a:srgbClr val="000000"/>
                 </a:solidFill>
@@ -5841,7 +5944,7 @@
         <p:spPr>
           <a:xfrm>
             <a:off x="595745" y="263238"/>
-            <a:ext cx="9434946" cy="5668963"/>
+            <a:ext cx="8123139" cy="5668963"/>
           </a:xfrm>
         </p:spPr>
         <p:txBody>
@@ -5864,115 +5967,108 @@
             <a:endParaRPr lang="fr-FR" sz="3600" dirty="0" smtClean="0"/>
           </a:p>
           <a:p>
-            <a:pPr marL="457200" lvl="1" indent="0">
-              <a:buNone/>
-            </a:pPr>
+            <a:pPr marL="0" indent="0">
+              <a:buNone/>
+            </a:pPr>
+            <a:r>
+              <a:rPr lang="fr-FR" sz="4000" dirty="0" smtClean="0"/>
+              <a:t>N’importe quel </a:t>
+            </a:r>
             <a:r>
               <a:rPr lang="fr-FR" sz="4000" dirty="0" smtClean="0">
                 <a:solidFill>
                   <a:srgbClr val="FF0000"/>
                 </a:solidFill>
               </a:rPr>
-              <a:t>Une comparaison </a:t>
-            </a:r>
-            <a:endParaRPr lang="fr-FR" sz="4000" dirty="0">
-              <a:solidFill>
-                <a:srgbClr val="FF0000"/>
-              </a:solidFill>
-            </a:endParaRPr>
-          </a:p>
-          <a:p>
-            <a:pPr marL="457200" lvl="1" indent="0">
-              <a:buNone/>
-            </a:pPr>
+              <a:t>objet</a:t>
+            </a:r>
+            <a:r>
+              <a:rPr lang="fr-FR" sz="4000" dirty="0" smtClean="0"/>
+              <a:t> ou </a:t>
+            </a:r>
             <a:r>
               <a:rPr lang="fr-FR" sz="4000" dirty="0" smtClean="0">
-                <a:latin typeface="Courier New" panose="02070309020205020404" pitchFamily="49" charset="0"/>
-                <a:cs typeface="Courier New" panose="02070309020205020404" pitchFamily="49" charset="0"/>
-              </a:rPr>
-              <a:t>&gt; &gt;=</a:t>
-            </a:r>
-            <a:r>
-              <a:rPr lang="fr-FR" sz="4000" dirty="0">
-                <a:latin typeface="Courier New" panose="02070309020205020404" pitchFamily="49" charset="0"/>
-                <a:cs typeface="Courier New" panose="02070309020205020404" pitchFamily="49" charset="0"/>
-              </a:rPr>
-              <a:t>	&lt; </a:t>
-            </a:r>
-            <a:r>
-              <a:rPr lang="fr-FR" sz="4000" dirty="0" smtClean="0">
-                <a:latin typeface="Courier New" panose="02070309020205020404" pitchFamily="49" charset="0"/>
-                <a:cs typeface="Courier New" panose="02070309020205020404" pitchFamily="49" charset="0"/>
-              </a:rPr>
-              <a:t>&lt;= == !=</a:t>
-            </a:r>
-          </a:p>
-          <a:p>
-            <a:pPr marL="0" indent="0">
-              <a:buNone/>
-            </a:pPr>
-            <a:endParaRPr lang="en-US" sz="4000" dirty="0" smtClean="0">
-              <a:latin typeface="Courier New" panose="02070309020205020404" pitchFamily="49" charset="0"/>
-              <a:cs typeface="Courier New" panose="02070309020205020404" pitchFamily="49" charset="0"/>
-            </a:endParaRPr>
-          </a:p>
-          <a:p>
-            <a:pPr marL="0" indent="0">
-              <a:buNone/>
-            </a:pPr>
-            <a:r>
-              <a:rPr lang="en-US" sz="4000" dirty="0" smtClean="0">
-                <a:latin typeface="Courier New" panose="02070309020205020404" pitchFamily="49" charset="0"/>
-                <a:cs typeface="Courier New" panose="02070309020205020404" pitchFamily="49" charset="0"/>
-              </a:rPr>
-              <a:t>if </a:t>
-            </a:r>
-            <a:r>
-              <a:rPr lang="en-US" sz="4000" dirty="0">
-                <a:latin typeface="Courier New" panose="02070309020205020404" pitchFamily="49" charset="0"/>
-                <a:cs typeface="Courier New" panose="02070309020205020404" pitchFamily="49" charset="0"/>
-              </a:rPr>
-              <a:t>a != b:</a:t>
-            </a:r>
-          </a:p>
-          <a:p>
-            <a:pPr marL="0" indent="0">
-              <a:buNone/>
-            </a:pPr>
-            <a:r>
-              <a:rPr lang="en-US" sz="4000" dirty="0">
-                <a:latin typeface="Courier New" panose="02070309020205020404" pitchFamily="49" charset="0"/>
-                <a:cs typeface="Courier New" panose="02070309020205020404" pitchFamily="49" charset="0"/>
-              </a:rPr>
-              <a:t>    </a:t>
-            </a:r>
-            <a:r>
-              <a:rPr lang="en-US" sz="4000" dirty="0" smtClean="0">
-                <a:latin typeface="Courier New" panose="02070309020205020404" pitchFamily="49" charset="0"/>
-                <a:cs typeface="Courier New" panose="02070309020205020404" pitchFamily="49" charset="0"/>
-              </a:rPr>
-              <a:t>print('faux')</a:t>
-            </a:r>
-          </a:p>
-          <a:p>
-            <a:pPr marL="0" indent="0">
-              <a:buNone/>
-            </a:pPr>
-            <a:endParaRPr lang="fr-FR" sz="4000" dirty="0" smtClean="0">
-              <a:latin typeface="Courier New" panose="02070309020205020404" pitchFamily="49" charset="0"/>
-              <a:cs typeface="Courier New" panose="02070309020205020404" pitchFamily="49" charset="0"/>
-            </a:endParaRPr>
-          </a:p>
-          <a:p>
-            <a:pPr marL="457200" lvl="1" indent="0">
-              <a:buNone/>
-            </a:pPr>
+                <a:solidFill>
+                  <a:srgbClr val="FF0000"/>
+                </a:solidFill>
+              </a:rPr>
+              <a:t>expression</a:t>
+            </a:r>
+          </a:p>
+          <a:p>
+            <a:pPr lvl="1">
+              <a:buFont typeface="Arial" panose="020B0604020202020204" pitchFamily="34" charset="0"/>
+              <a:buChar char="•"/>
+            </a:pPr>
+            <a:r>
+              <a:rPr lang="fr-FR" sz="3600" dirty="0" err="1" smtClean="0">
+                <a:latin typeface="Courier New" panose="02070309020205020404" pitchFamily="49" charset="0"/>
+                <a:cs typeface="Courier New" panose="02070309020205020404" pitchFamily="49" charset="0"/>
+              </a:rPr>
+              <a:t>bool</a:t>
+            </a:r>
             <a:r>
               <a:rPr lang="fr-FR" sz="3600" dirty="0" smtClean="0">
-                <a:cs typeface="Courier New" panose="02070309020205020404" pitchFamily="49" charset="0"/>
-              </a:rPr>
-              <a:t>	</a:t>
-            </a:r>
+                <a:latin typeface="Courier New" panose="02070309020205020404" pitchFamily="49" charset="0"/>
+                <a:cs typeface="Courier New" panose="02070309020205020404" pitchFamily="49" charset="0"/>
+              </a:rPr>
+              <a:t>(objet)</a:t>
+            </a:r>
+          </a:p>
+          <a:p>
+            <a:pPr lvl="2">
+              <a:buFont typeface="Arial" panose="020B0604020202020204" pitchFamily="34" charset="0"/>
+              <a:buChar char="•"/>
+            </a:pPr>
+            <a:r>
+              <a:rPr lang="fr-FR" sz="3200" dirty="0" smtClean="0">
+                <a:latin typeface="Courier New" panose="02070309020205020404" pitchFamily="49" charset="0"/>
+                <a:cs typeface="Courier New" panose="02070309020205020404" pitchFamily="49" charset="0"/>
+              </a:rPr>
+              <a:t>objet.__</a:t>
+            </a:r>
+            <a:r>
+              <a:rPr lang="fr-FR" sz="3200" dirty="0" err="1" smtClean="0">
+                <a:latin typeface="Courier New" panose="02070309020205020404" pitchFamily="49" charset="0"/>
+                <a:cs typeface="Courier New" panose="02070309020205020404" pitchFamily="49" charset="0"/>
+              </a:rPr>
+              <a:t>bool</a:t>
+            </a:r>
+            <a:r>
+              <a:rPr lang="fr-FR" sz="3200" dirty="0" smtClean="0">
+                <a:latin typeface="Courier New" panose="02070309020205020404" pitchFamily="49" charset="0"/>
+                <a:cs typeface="Courier New" panose="02070309020205020404" pitchFamily="49" charset="0"/>
+              </a:rPr>
+              <a:t>__()</a:t>
+            </a:r>
+          </a:p>
+          <a:p>
+            <a:pPr lvl="2">
+              <a:buFont typeface="Arial" panose="020B0604020202020204" pitchFamily="34" charset="0"/>
+              <a:buChar char="•"/>
+            </a:pPr>
+            <a:r>
+              <a:rPr lang="fr-FR" sz="3200" dirty="0" smtClean="0">
+                <a:latin typeface="Courier New" panose="02070309020205020404" pitchFamily="49" charset="0"/>
+                <a:cs typeface="Courier New" panose="02070309020205020404" pitchFamily="49" charset="0"/>
+              </a:rPr>
+              <a:t>objet.__</a:t>
+            </a:r>
+            <a:r>
+              <a:rPr lang="fr-FR" sz="3200" dirty="0" err="1" smtClean="0">
+                <a:latin typeface="Courier New" panose="02070309020205020404" pitchFamily="49" charset="0"/>
+                <a:cs typeface="Courier New" panose="02070309020205020404" pitchFamily="49" charset="0"/>
+              </a:rPr>
+              <a:t>len</a:t>
+            </a:r>
+            <a:r>
+              <a:rPr lang="fr-FR" sz="3200" dirty="0" smtClean="0">
+                <a:latin typeface="Courier New" panose="02070309020205020404" pitchFamily="49" charset="0"/>
+                <a:cs typeface="Courier New" panose="02070309020205020404" pitchFamily="49" charset="0"/>
+              </a:rPr>
+              <a:t>__()</a:t>
+            </a:r>
+            <a:endParaRPr lang="fr-FR" sz="3200" dirty="0" smtClean="0"/>
           </a:p>
           <a:p>
             <a:pPr marL="457200" lvl="1" indent="0">
@@ -5987,7 +6083,7 @@
     </p:spTree>
     <p:extLst>
       <p:ext uri="{BB962C8B-B14F-4D97-AF65-F5344CB8AC3E}">
-        <p14:creationId xmlns:p14="http://schemas.microsoft.com/office/powerpoint/2010/main" val="3917763919"/>
+        <p14:creationId xmlns:p14="http://schemas.microsoft.com/office/powerpoint/2010/main" val="4138264866"/>
       </p:ext>
     </p:extLst>
   </p:cSld>
@@ -6057,15 +6153,33 @@
                                   </p:childTnLst>
                                 </p:cTn>
                               </p:par>
+                            </p:childTnLst>
+                          </p:cTn>
+                        </p:par>
+                      </p:childTnLst>
+                    </p:cTn>
+                  </p:par>
+                  <p:par>
+                    <p:cTn id="8" fill="hold">
+                      <p:stCondLst>
+                        <p:cond delay="indefinite"/>
+                      </p:stCondLst>
+                      <p:childTnLst>
+                        <p:par>
+                          <p:cTn id="9" fill="hold">
+                            <p:stCondLst>
+                              <p:cond delay="0"/>
+                            </p:stCondLst>
+                            <p:childTnLst>
                               <p:par>
-                                <p:cTn id="8" presetID="10" presetClass="entr" presetSubtype="0" fill="hold" nodeType="withEffect">
+                                <p:cTn id="10" presetID="10" presetClass="entr" presetSubtype="0" fill="hold" nodeType="clickEffect">
                                   <p:stCondLst>
                                     <p:cond delay="0"/>
                                   </p:stCondLst>
                                   <p:childTnLst>
                                     <p:set>
                                       <p:cBhvr>
-                                        <p:cTn id="9" dur="1" fill="hold">
+                                        <p:cTn id="11" dur="1" fill="hold">
                                           <p:stCondLst>
                                             <p:cond delay="0"/>
                                           </p:stCondLst>
@@ -6087,7 +6201,7 @@
                                     </p:set>
                                     <p:animEffect transition="in" filter="fade">
                                       <p:cBhvr>
-                                        <p:cTn id="10" dur="500"/>
+                                        <p:cTn id="12" dur="500"/>
                                         <p:tgtEl>
                                           <p:spTgt spid="3">
                                             <p:txEl>
@@ -6107,29 +6221,87 @@
                     </p:cTn>
                   </p:par>
                   <p:par>
-                    <p:cTn id="11" fill="hold">
+                    <p:cTn id="13" fill="hold">
                       <p:stCondLst>
                         <p:cond delay="indefinite"/>
                       </p:stCondLst>
                       <p:childTnLst>
                         <p:par>
-                          <p:cTn id="12" fill="hold">
+                          <p:cTn id="14" fill="hold">
                             <p:stCondLst>
                               <p:cond delay="0"/>
                             </p:stCondLst>
                             <p:childTnLst>
                               <p:par>
-                                <p:cTn id="13" presetID="1" presetClass="entr" presetSubtype="0" fill="hold" nodeType="clickEffect">
+                                <p:cTn id="15" presetID="10" presetClass="entr" presetSubtype="0" fill="hold" nodeType="clickEffect">
                                   <p:stCondLst>
                                     <p:cond delay="0"/>
                                   </p:stCondLst>
-                                  <p:iterate type="lt">
-                                    <p:tmAbs val="100"/>
-                                  </p:iterate>
                                   <p:childTnLst>
                                     <p:set>
                                       <p:cBhvr>
-                                        <p:cTn id="14" dur="1" fill="hold">
+                                        <p:cTn id="16" dur="1" fill="hold">
+                                          <p:stCondLst>
+                                            <p:cond delay="0"/>
+                                          </p:stCondLst>
+                                        </p:cTn>
+                                        <p:tgtEl>
+                                          <p:spTgt spid="3">
+                                            <p:txEl>
+                                              <p:pRg st="4" end="4"/>
+                                            </p:txEl>
+                                          </p:spTgt>
+                                        </p:tgtEl>
+                                        <p:attrNameLst>
+                                          <p:attrName>style.visibility</p:attrName>
+                                        </p:attrNameLst>
+                                      </p:cBhvr>
+                                      <p:to>
+                                        <p:strVal val="visible"/>
+                                      </p:to>
+                                    </p:set>
+                                    <p:animEffect transition="in" filter="fade">
+                                      <p:cBhvr>
+                                        <p:cTn id="17" dur="500"/>
+                                        <p:tgtEl>
+                                          <p:spTgt spid="3">
+                                            <p:txEl>
+                                              <p:pRg st="4" end="4"/>
+                                            </p:txEl>
+                                          </p:spTgt>
+                                        </p:tgtEl>
+                                      </p:cBhvr>
+                                    </p:animEffect>
+                                  </p:childTnLst>
+                                </p:cTn>
+                              </p:par>
+                            </p:childTnLst>
+                          </p:cTn>
+                        </p:par>
+                      </p:childTnLst>
+                    </p:cTn>
+                  </p:par>
+                  <p:par>
+                    <p:cTn id="18" fill="hold">
+                      <p:stCondLst>
+                        <p:cond delay="indefinite"/>
+                      </p:stCondLst>
+                      <p:childTnLst>
+                        <p:par>
+                          <p:cTn id="19" fill="hold">
+                            <p:stCondLst>
+                              <p:cond delay="0"/>
+                            </p:stCondLst>
+                            <p:childTnLst>
+                              <p:par>
+                                <p:cTn id="20" presetID="10" presetClass="entr" presetSubtype="0" fill="hold" nodeType="clickEffect">
+                                  <p:stCondLst>
+                                    <p:cond delay="0"/>
+                                  </p:stCondLst>
+                                  <p:childTnLst>
+                                    <p:set>
+                                      <p:cBhvr>
+                                        <p:cTn id="21" dur="1" fill="hold">
                                           <p:stCondLst>
                                             <p:cond delay="0"/>
                                           </p:stCondLst>
@@ -6149,49 +6321,18 @@
                                         <p:strVal val="visible"/>
                                       </p:to>
                                     </p:set>
-                                  </p:childTnLst>
-                                </p:cTn>
-                              </p:par>
-                            </p:childTnLst>
-                          </p:cTn>
-                        </p:par>
-                        <p:par>
-                          <p:cTn id="15" fill="hold">
-                            <p:stCondLst>
-                              <p:cond delay="601"/>
-                            </p:stCondLst>
-                            <p:childTnLst>
-                              <p:par>
-                                <p:cTn id="16" presetID="1" presetClass="entr" presetSubtype="0" fill="hold" nodeType="afterEffect">
-                                  <p:stCondLst>
-                                    <p:cond delay="0"/>
-                                  </p:stCondLst>
-                                  <p:iterate type="lt">
-                                    <p:tmAbs val="100"/>
-                                  </p:iterate>
-                                  <p:childTnLst>
-                                    <p:set>
+                                    <p:animEffect transition="in" filter="fade">
                                       <p:cBhvr>
-                                        <p:cTn id="17" dur="1" fill="hold">
-                                          <p:stCondLst>
-                                            <p:cond delay="0"/>
-                                          </p:stCondLst>
-                                        </p:cTn>
+                                        <p:cTn id="22" dur="500"/>
                                         <p:tgtEl>
                                           <p:spTgt spid="3">
                                             <p:txEl>
-                                              <p:pRg st="6" end="6"/>
+                                              <p:pRg st="5" end="5"/>
                                             </p:txEl>
                                           </p:spTgt>
                                         </p:tgtEl>
-                                        <p:attrNameLst>
-                                          <p:attrName>style.visibility</p:attrName>
-                                        </p:attrNameLst>
                                       </p:cBhvr>
-                                      <p:to>
-                                        <p:strVal val="visible"/>
-                                      </p:to>
-                                    </p:set>
+                                    </p:animEffect>
                                   </p:childTnLst>
                                 </p:cTn>
                               </p:par>
@@ -6267,300 +6408,10 @@
               <a:buNone/>
             </a:pPr>
             <a:r>
-              <a:rPr lang="fr-FR" sz="4400" dirty="0"/>
-              <a:t>Que peut être un test dans un if ?</a:t>
-            </a:r>
-          </a:p>
-          <a:p>
-            <a:pPr marL="457200" lvl="1" indent="0">
-              <a:buNone/>
-            </a:pPr>
-            <a:endParaRPr lang="fr-FR" sz="3600" dirty="0" smtClean="0"/>
-          </a:p>
-          <a:p>
-            <a:pPr marL="457200" lvl="1" indent="0">
-              <a:buNone/>
-            </a:pPr>
-            <a:r>
-              <a:rPr lang="fr-FR" sz="4000" dirty="0" smtClean="0">
-                <a:solidFill>
-                  <a:srgbClr val="FF0000"/>
-                </a:solidFill>
-              </a:rPr>
-              <a:t>Un test d’appartenance </a:t>
-            </a:r>
-            <a:r>
-              <a:rPr lang="fr-FR" sz="4000" dirty="0" smtClean="0">
-                <a:solidFill>
-                  <a:srgbClr val="FF0000"/>
-                </a:solidFill>
-                <a:latin typeface="Courier New" panose="02070309020205020404" pitchFamily="49" charset="0"/>
-                <a:cs typeface="Courier New" panose="02070309020205020404" pitchFamily="49" charset="0"/>
-              </a:rPr>
-              <a:t>in</a:t>
-            </a:r>
-            <a:endParaRPr lang="fr-FR" sz="4000" dirty="0">
-              <a:solidFill>
-                <a:srgbClr val="FF0000"/>
-              </a:solidFill>
-              <a:latin typeface="Courier New" panose="02070309020205020404" pitchFamily="49" charset="0"/>
-              <a:cs typeface="Courier New" panose="02070309020205020404" pitchFamily="49" charset="0"/>
-            </a:endParaRPr>
-          </a:p>
-          <a:p>
-            <a:pPr marL="0" indent="0">
-              <a:buNone/>
-            </a:pPr>
-            <a:endParaRPr lang="en-US" sz="4000" dirty="0" smtClean="0">
-              <a:latin typeface="Courier New" panose="02070309020205020404" pitchFamily="49" charset="0"/>
-              <a:cs typeface="Courier New" panose="02070309020205020404" pitchFamily="49" charset="0"/>
-            </a:endParaRPr>
-          </a:p>
-          <a:p>
-            <a:pPr marL="0" indent="0">
-              <a:buNone/>
-            </a:pPr>
-            <a:r>
-              <a:rPr lang="en-US" sz="4000" dirty="0" smtClean="0">
-                <a:latin typeface="Courier New" panose="02070309020205020404" pitchFamily="49" charset="0"/>
-                <a:cs typeface="Courier New" panose="02070309020205020404" pitchFamily="49" charset="0"/>
-              </a:rPr>
-              <a:t>if </a:t>
-            </a:r>
-            <a:r>
-              <a:rPr lang="en-US" sz="4000" dirty="0">
-                <a:latin typeface="Courier New" panose="02070309020205020404" pitchFamily="49" charset="0"/>
-                <a:cs typeface="Courier New" panose="02070309020205020404" pitchFamily="49" charset="0"/>
-              </a:rPr>
-              <a:t>'a' in 'marc':</a:t>
-            </a:r>
-          </a:p>
-          <a:p>
-            <a:pPr marL="0" indent="0">
-              <a:buNone/>
-            </a:pPr>
-            <a:r>
-              <a:rPr lang="en-US" sz="4000" dirty="0">
-                <a:latin typeface="Courier New" panose="02070309020205020404" pitchFamily="49" charset="0"/>
-                <a:cs typeface="Courier New" panose="02070309020205020404" pitchFamily="49" charset="0"/>
-              </a:rPr>
-              <a:t>    </a:t>
-            </a:r>
-            <a:r>
-              <a:rPr lang="en-US" sz="4000" dirty="0" smtClean="0">
-                <a:latin typeface="Courier New" panose="02070309020205020404" pitchFamily="49" charset="0"/>
-                <a:cs typeface="Courier New" panose="02070309020205020404" pitchFamily="49" charset="0"/>
-              </a:rPr>
-              <a:t>print('ok')</a:t>
-            </a:r>
-            <a:endParaRPr lang="fr-FR" sz="4000" dirty="0" smtClean="0">
-              <a:latin typeface="Courier New" panose="02070309020205020404" pitchFamily="49" charset="0"/>
-              <a:cs typeface="Courier New" panose="02070309020205020404" pitchFamily="49" charset="0"/>
-            </a:endParaRPr>
-          </a:p>
-          <a:p>
-            <a:pPr marL="457200" lvl="1" indent="0">
-              <a:buNone/>
-            </a:pPr>
-            <a:r>
-              <a:rPr lang="fr-FR" sz="3600" dirty="0" smtClean="0">
-                <a:cs typeface="Courier New" panose="02070309020205020404" pitchFamily="49" charset="0"/>
-              </a:rPr>
-              <a:t>	</a:t>
-            </a:r>
-          </a:p>
-          <a:p>
-            <a:pPr marL="457200" lvl="1" indent="0">
-              <a:buNone/>
-            </a:pPr>
-            <a:endParaRPr lang="fr-FR" sz="3600" dirty="0" smtClean="0">
-              <a:cs typeface="Courier New" panose="02070309020205020404" pitchFamily="49" charset="0"/>
-            </a:endParaRPr>
-          </a:p>
-        </p:txBody>
-      </p:sp>
-    </p:spTree>
-    <p:extLst>
-      <p:ext uri="{BB962C8B-B14F-4D97-AF65-F5344CB8AC3E}">
-        <p14:creationId xmlns:p14="http://schemas.microsoft.com/office/powerpoint/2010/main" val="3181682277"/>
-      </p:ext>
-    </p:extLst>
-  </p:cSld>
-  <p:clrMapOvr>
-    <a:masterClrMapping/>
-  </p:clrMapOvr>
-  <p:timing>
-    <p:tnLst>
-      <p:par>
-        <p:cTn id="1" dur="indefinite" restart="never" nodeType="tmRoot">
-          <p:childTnLst>
-            <p:seq concurrent="1" nextAc="seek">
-              <p:cTn id="2" dur="indefinite" nodeType="mainSeq">
-                <p:childTnLst>
-                  <p:par>
-                    <p:cTn id="3" fill="hold">
-                      <p:stCondLst>
-                        <p:cond delay="indefinite"/>
-                      </p:stCondLst>
-                      <p:childTnLst>
-                        <p:par>
-                          <p:cTn id="4" fill="hold">
-                            <p:stCondLst>
-                              <p:cond delay="0"/>
-                            </p:stCondLst>
-                            <p:childTnLst>
-                              <p:par>
-                                <p:cTn id="5" presetID="1" presetClass="entr" presetSubtype="0" fill="hold" nodeType="clickEffect">
-                                  <p:stCondLst>
-                                    <p:cond delay="0"/>
-                                  </p:stCondLst>
-                                  <p:iterate type="lt">
-                                    <p:tmAbs val="100"/>
-                                  </p:iterate>
-                                  <p:childTnLst>
-                                    <p:set>
-                                      <p:cBhvr>
-                                        <p:cTn id="6" dur="1" fill="hold">
-                                          <p:stCondLst>
-                                            <p:cond delay="0"/>
-                                          </p:stCondLst>
-                                        </p:cTn>
-                                        <p:tgtEl>
-                                          <p:spTgt spid="3">
-                                            <p:txEl>
-                                              <p:pRg st="4" end="4"/>
-                                            </p:txEl>
-                                          </p:spTgt>
-                                        </p:tgtEl>
-                                        <p:attrNameLst>
-                                          <p:attrName>style.visibility</p:attrName>
-                                        </p:attrNameLst>
-                                      </p:cBhvr>
-                                      <p:to>
-                                        <p:strVal val="visible"/>
-                                      </p:to>
-                                    </p:set>
-                                  </p:childTnLst>
-                                </p:cTn>
-                              </p:par>
-                            </p:childTnLst>
-                          </p:cTn>
-                        </p:par>
-                        <p:par>
-                          <p:cTn id="7" fill="hold">
-                            <p:stCondLst>
-                              <p:cond delay="1301"/>
-                            </p:stCondLst>
-                            <p:childTnLst>
-                              <p:par>
-                                <p:cTn id="8" presetID="1" presetClass="entr" presetSubtype="0" fill="hold" nodeType="afterEffect">
-                                  <p:stCondLst>
-                                    <p:cond delay="0"/>
-                                  </p:stCondLst>
-                                  <p:iterate type="lt">
-                                    <p:tmAbs val="100"/>
-                                  </p:iterate>
-                                  <p:childTnLst>
-                                    <p:set>
-                                      <p:cBhvr>
-                                        <p:cTn id="9" dur="1" fill="hold">
-                                          <p:stCondLst>
-                                            <p:cond delay="0"/>
-                                          </p:stCondLst>
-                                        </p:cTn>
-                                        <p:tgtEl>
-                                          <p:spTgt spid="3">
-                                            <p:txEl>
-                                              <p:pRg st="5" end="5"/>
-                                            </p:txEl>
-                                          </p:spTgt>
-                                        </p:tgtEl>
-                                        <p:attrNameLst>
-                                          <p:attrName>style.visibility</p:attrName>
-                                        </p:attrNameLst>
-                                      </p:cBhvr>
-                                      <p:to>
-                                        <p:strVal val="visible"/>
-                                      </p:to>
-                                    </p:set>
-                                  </p:childTnLst>
-                                </p:cTn>
-                              </p:par>
-                            </p:childTnLst>
-                          </p:cTn>
-                        </p:par>
-                      </p:childTnLst>
-                    </p:cTn>
-                  </p:par>
-                </p:childTnLst>
-              </p:cTn>
-              <p:prevCondLst>
-                <p:cond evt="onPrev" delay="0">
-                  <p:tgtEl>
-                    <p:sldTgt/>
-                  </p:tgtEl>
-                </p:cond>
-              </p:prevCondLst>
-              <p:nextCondLst>
-                <p:cond evt="onNext" delay="0">
-                  <p:tgtEl>
-                    <p:sldTgt/>
-                  </p:tgtEl>
-                </p:cond>
-              </p:nextCondLst>
-            </p:seq>
-          </p:childTnLst>
-        </p:cTn>
-      </p:par>
-    </p:tnLst>
-  </p:timing>
-</p:sld>
-</file>
-
-<file path=ppt/slides/slide4.xml><?xml version="1.0" encoding="utf-8"?>
-<p:sld xmlns:a="http://schemas.openxmlformats.org/drawingml/2006/main" xmlns:r="http://schemas.openxmlformats.org/officeDocument/2006/relationships" xmlns:p="http://schemas.openxmlformats.org/presentationml/2006/main">
-  <p:cSld>
-    <p:spTree>
-      <p:nvGrpSpPr>
-        <p:cNvPr id="1" name=""/>
-        <p:cNvGrpSpPr/>
-        <p:nvPr/>
-      </p:nvGrpSpPr>
-      <p:grpSpPr>
-        <a:xfrm>
-          <a:off x="0" y="0"/>
-          <a:ext cx="0" cy="0"/>
-          <a:chOff x="0" y="0"/>
-          <a:chExt cx="0" cy="0"/>
-        </a:xfrm>
-      </p:grpSpPr>
-      <p:sp>
-        <p:nvSpPr>
-          <p:cNvPr id="3" name="Espace réservé du contenu 2"/>
-          <p:cNvSpPr>
-            <a:spLocks noGrp="1"/>
-          </p:cNvSpPr>
-          <p:nvPr>
-            <p:ph idx="1"/>
-          </p:nvPr>
-        </p:nvSpPr>
-        <p:spPr>
-          <a:xfrm>
-            <a:off x="595745" y="263238"/>
-            <a:ext cx="9434946" cy="5668963"/>
-          </a:xfrm>
-        </p:spPr>
-        <p:txBody>
-          <a:bodyPr/>
-          <a:lstStyle/>
-          <a:p>
-            <a:pPr marL="0" indent="0">
-              <a:buNone/>
-            </a:pPr>
-            <a:r>
-              <a:rPr lang="fr-FR" sz="4400" dirty="0"/>
-              <a:t>Que peut être un test dans un if ?</a:t>
-            </a:r>
+              <a:rPr lang="fr-FR" sz="4400" dirty="0" smtClean="0"/>
+              <a:t>Exemple d’objets</a:t>
+            </a:r>
+            <a:endParaRPr lang="fr-FR" sz="4400" dirty="0"/>
           </a:p>
           <a:p>
             <a:pPr lvl="1">
@@ -7008,6 +6859,422 @@
 </p:sld>
 </file>
 
+<file path=ppt/slides/slide4.xml><?xml version="1.0" encoding="utf-8"?>
+<p:sld xmlns:a="http://schemas.openxmlformats.org/drawingml/2006/main" xmlns:r="http://schemas.openxmlformats.org/officeDocument/2006/relationships" xmlns:p="http://schemas.openxmlformats.org/presentationml/2006/main">
+  <p:cSld>
+    <p:spTree>
+      <p:nvGrpSpPr>
+        <p:cNvPr id="1" name=""/>
+        <p:cNvGrpSpPr/>
+        <p:nvPr/>
+      </p:nvGrpSpPr>
+      <p:grpSpPr>
+        <a:xfrm>
+          <a:off x="0" y="0"/>
+          <a:ext cx="0" cy="0"/>
+          <a:chOff x="0" y="0"/>
+          <a:chExt cx="0" cy="0"/>
+        </a:xfrm>
+      </p:grpSpPr>
+      <p:sp>
+        <p:nvSpPr>
+          <p:cNvPr id="3" name="Espace réservé du contenu 2"/>
+          <p:cNvSpPr>
+            <a:spLocks noGrp="1"/>
+          </p:cNvSpPr>
+          <p:nvPr>
+            <p:ph idx="1"/>
+          </p:nvPr>
+        </p:nvSpPr>
+        <p:spPr>
+          <a:xfrm>
+            <a:off x="595745" y="263238"/>
+            <a:ext cx="9434946" cy="5668963"/>
+          </a:xfrm>
+        </p:spPr>
+        <p:txBody>
+          <a:bodyPr/>
+          <a:lstStyle/>
+          <a:p>
+            <a:pPr marL="0" indent="0">
+              <a:buNone/>
+            </a:pPr>
+            <a:r>
+              <a:rPr lang="fr-FR" sz="4400" dirty="0" smtClean="0"/>
+              <a:t>Exemple d’expressions</a:t>
+            </a:r>
+            <a:endParaRPr lang="fr-FR" sz="4400" dirty="0" smtClean="0"/>
+          </a:p>
+          <a:p>
+            <a:pPr lvl="1">
+              <a:buFont typeface="Arial" panose="020B0604020202020204" pitchFamily="34" charset="0"/>
+              <a:buChar char="•"/>
+            </a:pPr>
+            <a:endParaRPr lang="fr-FR" sz="3600" dirty="0" smtClean="0"/>
+          </a:p>
+          <a:p>
+            <a:pPr marL="457200" lvl="1" indent="0">
+              <a:buNone/>
+            </a:pPr>
+            <a:r>
+              <a:rPr lang="fr-FR" sz="4000" dirty="0" smtClean="0">
+                <a:solidFill>
+                  <a:srgbClr val="FF0000"/>
+                </a:solidFill>
+              </a:rPr>
+              <a:t>Une comparaison </a:t>
+            </a:r>
+            <a:endParaRPr lang="fr-FR" sz="4000" dirty="0">
+              <a:solidFill>
+                <a:srgbClr val="FF0000"/>
+              </a:solidFill>
+            </a:endParaRPr>
+          </a:p>
+          <a:p>
+            <a:pPr marL="457200" lvl="1" indent="0">
+              <a:buNone/>
+            </a:pPr>
+            <a:r>
+              <a:rPr lang="fr-FR" sz="4000" dirty="0" smtClean="0">
+                <a:latin typeface="Courier New" panose="02070309020205020404" pitchFamily="49" charset="0"/>
+                <a:cs typeface="Courier New" panose="02070309020205020404" pitchFamily="49" charset="0"/>
+              </a:rPr>
+              <a:t>&gt; &gt;=</a:t>
+            </a:r>
+            <a:r>
+              <a:rPr lang="fr-FR" sz="4000" dirty="0">
+                <a:latin typeface="Courier New" panose="02070309020205020404" pitchFamily="49" charset="0"/>
+                <a:cs typeface="Courier New" panose="02070309020205020404" pitchFamily="49" charset="0"/>
+              </a:rPr>
+              <a:t>	&lt; </a:t>
+            </a:r>
+            <a:r>
+              <a:rPr lang="fr-FR" sz="4000" dirty="0" smtClean="0">
+                <a:latin typeface="Courier New" panose="02070309020205020404" pitchFamily="49" charset="0"/>
+                <a:cs typeface="Courier New" panose="02070309020205020404" pitchFamily="49" charset="0"/>
+              </a:rPr>
+              <a:t>&lt;= == !=</a:t>
+            </a:r>
+          </a:p>
+          <a:p>
+            <a:pPr marL="0" indent="0">
+              <a:buNone/>
+            </a:pPr>
+            <a:endParaRPr lang="en-US" sz="4000" dirty="0" smtClean="0">
+              <a:latin typeface="Courier New" panose="02070309020205020404" pitchFamily="49" charset="0"/>
+              <a:cs typeface="Courier New" panose="02070309020205020404" pitchFamily="49" charset="0"/>
+            </a:endParaRPr>
+          </a:p>
+          <a:p>
+            <a:pPr marL="0" indent="0">
+              <a:buNone/>
+            </a:pPr>
+            <a:r>
+              <a:rPr lang="en-US" sz="4000" dirty="0" smtClean="0">
+                <a:latin typeface="Courier New" panose="02070309020205020404" pitchFamily="49" charset="0"/>
+                <a:cs typeface="Courier New" panose="02070309020205020404" pitchFamily="49" charset="0"/>
+              </a:rPr>
+              <a:t>if </a:t>
+            </a:r>
+            <a:r>
+              <a:rPr lang="en-US" sz="4000" dirty="0">
+                <a:latin typeface="Courier New" panose="02070309020205020404" pitchFamily="49" charset="0"/>
+                <a:cs typeface="Courier New" panose="02070309020205020404" pitchFamily="49" charset="0"/>
+              </a:rPr>
+              <a:t>a != b:</a:t>
+            </a:r>
+          </a:p>
+          <a:p>
+            <a:pPr marL="0" indent="0">
+              <a:buNone/>
+            </a:pPr>
+            <a:r>
+              <a:rPr lang="en-US" sz="4000" dirty="0">
+                <a:latin typeface="Courier New" panose="02070309020205020404" pitchFamily="49" charset="0"/>
+                <a:cs typeface="Courier New" panose="02070309020205020404" pitchFamily="49" charset="0"/>
+              </a:rPr>
+              <a:t>    </a:t>
+            </a:r>
+            <a:r>
+              <a:rPr lang="en-US" sz="4000" dirty="0" smtClean="0">
+                <a:latin typeface="Courier New" panose="02070309020205020404" pitchFamily="49" charset="0"/>
+                <a:cs typeface="Courier New" panose="02070309020205020404" pitchFamily="49" charset="0"/>
+              </a:rPr>
+              <a:t>print('faux')</a:t>
+            </a:r>
+          </a:p>
+          <a:p>
+            <a:pPr marL="0" indent="0">
+              <a:buNone/>
+            </a:pPr>
+            <a:endParaRPr lang="fr-FR" sz="4000" dirty="0" smtClean="0">
+              <a:latin typeface="Courier New" panose="02070309020205020404" pitchFamily="49" charset="0"/>
+              <a:cs typeface="Courier New" panose="02070309020205020404" pitchFamily="49" charset="0"/>
+            </a:endParaRPr>
+          </a:p>
+          <a:p>
+            <a:pPr marL="457200" lvl="1" indent="0">
+              <a:buNone/>
+            </a:pPr>
+            <a:r>
+              <a:rPr lang="fr-FR" sz="3600" dirty="0" smtClean="0">
+                <a:cs typeface="Courier New" panose="02070309020205020404" pitchFamily="49" charset="0"/>
+              </a:rPr>
+              <a:t>	</a:t>
+            </a:r>
+          </a:p>
+          <a:p>
+            <a:pPr marL="457200" lvl="1" indent="0">
+              <a:buNone/>
+            </a:pPr>
+            <a:endParaRPr lang="fr-FR" sz="3600" dirty="0" smtClean="0">
+              <a:cs typeface="Courier New" panose="02070309020205020404" pitchFamily="49" charset="0"/>
+            </a:endParaRPr>
+          </a:p>
+        </p:txBody>
+      </p:sp>
+    </p:spTree>
+    <p:extLst>
+      <p:ext uri="{BB962C8B-B14F-4D97-AF65-F5344CB8AC3E}">
+        <p14:creationId xmlns:p14="http://schemas.microsoft.com/office/powerpoint/2010/main" val="3917763919"/>
+      </p:ext>
+    </p:extLst>
+  </p:cSld>
+  <p:clrMapOvr>
+    <a:masterClrMapping/>
+  </p:clrMapOvr>
+  <p:timing>
+    <p:tnLst>
+      <p:par>
+        <p:cTn id="1" dur="indefinite" restart="never" nodeType="tmRoot">
+          <p:childTnLst>
+            <p:seq concurrent="1" nextAc="seek">
+              <p:cTn id="2" dur="indefinite" nodeType="mainSeq">
+                <p:childTnLst>
+                  <p:par>
+                    <p:cTn id="3" fill="hold">
+                      <p:stCondLst>
+                        <p:cond delay="indefinite"/>
+                      </p:stCondLst>
+                      <p:childTnLst>
+                        <p:par>
+                          <p:cTn id="4" fill="hold">
+                            <p:stCondLst>
+                              <p:cond delay="0"/>
+                            </p:stCondLst>
+                            <p:childTnLst>
+                              <p:par>
+                                <p:cTn id="5" presetID="10" presetClass="entr" presetSubtype="0" fill="hold" nodeType="clickEffect">
+                                  <p:stCondLst>
+                                    <p:cond delay="0"/>
+                                  </p:stCondLst>
+                                  <p:childTnLst>
+                                    <p:set>
+                                      <p:cBhvr>
+                                        <p:cTn id="6" dur="1" fill="hold">
+                                          <p:stCondLst>
+                                            <p:cond delay="0"/>
+                                          </p:stCondLst>
+                                        </p:cTn>
+                                        <p:tgtEl>
+                                          <p:spTgt spid="3">
+                                            <p:txEl>
+                                              <p:pRg st="2" end="2"/>
+                                            </p:txEl>
+                                          </p:spTgt>
+                                        </p:tgtEl>
+                                        <p:attrNameLst>
+                                          <p:attrName>style.visibility</p:attrName>
+                                        </p:attrNameLst>
+                                      </p:cBhvr>
+                                      <p:to>
+                                        <p:strVal val="visible"/>
+                                      </p:to>
+                                    </p:set>
+                                    <p:animEffect transition="in" filter="fade">
+                                      <p:cBhvr>
+                                        <p:cTn id="7" dur="500"/>
+                                        <p:tgtEl>
+                                          <p:spTgt spid="3">
+                                            <p:txEl>
+                                              <p:pRg st="2" end="2"/>
+                                            </p:txEl>
+                                          </p:spTgt>
+                                        </p:tgtEl>
+                                      </p:cBhvr>
+                                    </p:animEffect>
+                                  </p:childTnLst>
+                                </p:cTn>
+                              </p:par>
+                              <p:par>
+                                <p:cTn id="8" presetID="10" presetClass="entr" presetSubtype="0" fill="hold" nodeType="withEffect">
+                                  <p:stCondLst>
+                                    <p:cond delay="0"/>
+                                  </p:stCondLst>
+                                  <p:childTnLst>
+                                    <p:set>
+                                      <p:cBhvr>
+                                        <p:cTn id="9" dur="1" fill="hold">
+                                          <p:stCondLst>
+                                            <p:cond delay="0"/>
+                                          </p:stCondLst>
+                                        </p:cTn>
+                                        <p:tgtEl>
+                                          <p:spTgt spid="3">
+                                            <p:txEl>
+                                              <p:pRg st="3" end="3"/>
+                                            </p:txEl>
+                                          </p:spTgt>
+                                        </p:tgtEl>
+                                        <p:attrNameLst>
+                                          <p:attrName>style.visibility</p:attrName>
+                                        </p:attrNameLst>
+                                      </p:cBhvr>
+                                      <p:to>
+                                        <p:strVal val="visible"/>
+                                      </p:to>
+                                    </p:set>
+                                    <p:animEffect transition="in" filter="fade">
+                                      <p:cBhvr>
+                                        <p:cTn id="10" dur="500"/>
+                                        <p:tgtEl>
+                                          <p:spTgt spid="3">
+                                            <p:txEl>
+                                              <p:pRg st="3" end="3"/>
+                                            </p:txEl>
+                                          </p:spTgt>
+                                        </p:tgtEl>
+                                      </p:cBhvr>
+                                    </p:animEffect>
+                                  </p:childTnLst>
+                                </p:cTn>
+                              </p:par>
+                            </p:childTnLst>
+                          </p:cTn>
+                        </p:par>
+                      </p:childTnLst>
+                    </p:cTn>
+                  </p:par>
+                  <p:par>
+                    <p:cTn id="11" fill="hold">
+                      <p:stCondLst>
+                        <p:cond delay="indefinite"/>
+                      </p:stCondLst>
+                      <p:childTnLst>
+                        <p:par>
+                          <p:cTn id="12" fill="hold">
+                            <p:stCondLst>
+                              <p:cond delay="0"/>
+                            </p:stCondLst>
+                            <p:childTnLst>
+                              <p:par>
+                                <p:cTn id="13" presetID="1" presetClass="entr" presetSubtype="0" fill="hold" nodeType="clickEffect">
+                                  <p:stCondLst>
+                                    <p:cond delay="0"/>
+                                  </p:stCondLst>
+                                  <p:iterate type="lt">
+                                    <p:tmAbs val="100"/>
+                                  </p:iterate>
+                                  <p:childTnLst>
+                                    <p:set>
+                                      <p:cBhvr>
+                                        <p:cTn id="14" dur="1" fill="hold">
+                                          <p:stCondLst>
+                                            <p:cond delay="0"/>
+                                          </p:stCondLst>
+                                        </p:cTn>
+                                        <p:tgtEl>
+                                          <p:spTgt spid="3">
+                                            <p:txEl>
+                                              <p:pRg st="5" end="5"/>
+                                            </p:txEl>
+                                          </p:spTgt>
+                                        </p:tgtEl>
+                                        <p:attrNameLst>
+                                          <p:attrName>style.visibility</p:attrName>
+                                        </p:attrNameLst>
+                                      </p:cBhvr>
+                                      <p:to>
+                                        <p:strVal val="visible"/>
+                                      </p:to>
+                                    </p:set>
+                                  </p:childTnLst>
+                                </p:cTn>
+                              </p:par>
+                            </p:childTnLst>
+                          </p:cTn>
+                        </p:par>
+                        <p:par>
+                          <p:cTn id="15" fill="hold">
+                            <p:stCondLst>
+                              <p:cond delay="601"/>
+                            </p:stCondLst>
+                            <p:childTnLst>
+                              <p:par>
+                                <p:cTn id="16" presetID="1" presetClass="entr" presetSubtype="0" fill="hold" nodeType="afterEffect">
+                                  <p:stCondLst>
+                                    <p:cond delay="0"/>
+                                  </p:stCondLst>
+                                  <p:iterate type="lt">
+                                    <p:tmAbs val="100"/>
+                                  </p:iterate>
+                                  <p:childTnLst>
+                                    <p:set>
+                                      <p:cBhvr>
+                                        <p:cTn id="17" dur="1" fill="hold">
+                                          <p:stCondLst>
+                                            <p:cond delay="0"/>
+                                          </p:stCondLst>
+                                        </p:cTn>
+                                        <p:tgtEl>
+                                          <p:spTgt spid="3">
+                                            <p:txEl>
+                                              <p:pRg st="6" end="6"/>
+                                            </p:txEl>
+                                          </p:spTgt>
+                                        </p:tgtEl>
+                                        <p:attrNameLst>
+                                          <p:attrName>style.visibility</p:attrName>
+                                        </p:attrNameLst>
+                                      </p:cBhvr>
+                                      <p:to>
+                                        <p:strVal val="visible"/>
+                                      </p:to>
+                                    </p:set>
+                                  </p:childTnLst>
+                                </p:cTn>
+                              </p:par>
+                            </p:childTnLst>
+                          </p:cTn>
+                        </p:par>
+                      </p:childTnLst>
+                    </p:cTn>
+                  </p:par>
+                </p:childTnLst>
+              </p:cTn>
+              <p:prevCondLst>
+                <p:cond evt="onPrev" delay="0">
+                  <p:tgtEl>
+                    <p:sldTgt/>
+                  </p:tgtEl>
+                </p:cond>
+              </p:prevCondLst>
+              <p:nextCondLst>
+                <p:cond evt="onNext" delay="0">
+                  <p:tgtEl>
+                    <p:sldTgt/>
+                  </p:tgtEl>
+                </p:cond>
+              </p:nextCondLst>
+            </p:seq>
+          </p:childTnLst>
+        </p:cTn>
+      </p:par>
+    </p:tnLst>
+  </p:timing>
+</p:sld>
+</file>
+
 <file path=ppt/slides/slide5.xml><?xml version="1.0" encoding="utf-8"?>
 <p:sld xmlns:a="http://schemas.openxmlformats.org/drawingml/2006/main" xmlns:r="http://schemas.openxmlformats.org/officeDocument/2006/relationships" xmlns:p="http://schemas.openxmlformats.org/presentationml/2006/main">
   <p:cSld>
@@ -7050,7 +7317,7 @@
             </a:pPr>
             <a:r>
               <a:rPr lang="fr-FR" sz="4400" dirty="0"/>
-              <a:t>Que peut être un test dans un if ?</a:t>
+              <a:t>Exemple d’expressions</a:t>
             </a:r>
           </a:p>
           <a:p>
@@ -7069,6 +7336,297 @@
                   <a:srgbClr val="FF0000"/>
                 </a:solidFill>
               </a:rPr>
+              <a:t>Un test d’appartenance </a:t>
+            </a:r>
+            <a:r>
+              <a:rPr lang="fr-FR" sz="4000" dirty="0" smtClean="0">
+                <a:solidFill>
+                  <a:srgbClr val="FF0000"/>
+                </a:solidFill>
+                <a:latin typeface="Courier New" panose="02070309020205020404" pitchFamily="49" charset="0"/>
+                <a:cs typeface="Courier New" panose="02070309020205020404" pitchFamily="49" charset="0"/>
+              </a:rPr>
+              <a:t>in</a:t>
+            </a:r>
+            <a:endParaRPr lang="fr-FR" sz="4000" dirty="0">
+              <a:solidFill>
+                <a:srgbClr val="FF0000"/>
+              </a:solidFill>
+              <a:latin typeface="Courier New" panose="02070309020205020404" pitchFamily="49" charset="0"/>
+              <a:cs typeface="Courier New" panose="02070309020205020404" pitchFamily="49" charset="0"/>
+            </a:endParaRPr>
+          </a:p>
+          <a:p>
+            <a:pPr marL="0" indent="0">
+              <a:buNone/>
+            </a:pPr>
+            <a:endParaRPr lang="en-US" sz="4000" dirty="0" smtClean="0">
+              <a:latin typeface="Courier New" panose="02070309020205020404" pitchFamily="49" charset="0"/>
+              <a:cs typeface="Courier New" panose="02070309020205020404" pitchFamily="49" charset="0"/>
+            </a:endParaRPr>
+          </a:p>
+          <a:p>
+            <a:pPr marL="0" indent="0">
+              <a:buNone/>
+            </a:pPr>
+            <a:r>
+              <a:rPr lang="en-US" sz="4000" dirty="0" smtClean="0">
+                <a:latin typeface="Courier New" panose="02070309020205020404" pitchFamily="49" charset="0"/>
+                <a:cs typeface="Courier New" panose="02070309020205020404" pitchFamily="49" charset="0"/>
+              </a:rPr>
+              <a:t>if </a:t>
+            </a:r>
+            <a:r>
+              <a:rPr lang="en-US" sz="4000" dirty="0">
+                <a:latin typeface="Courier New" panose="02070309020205020404" pitchFamily="49" charset="0"/>
+                <a:cs typeface="Courier New" panose="02070309020205020404" pitchFamily="49" charset="0"/>
+              </a:rPr>
+              <a:t>'a' in 'marc':</a:t>
+            </a:r>
+          </a:p>
+          <a:p>
+            <a:pPr marL="0" indent="0">
+              <a:buNone/>
+            </a:pPr>
+            <a:r>
+              <a:rPr lang="en-US" sz="4000" dirty="0">
+                <a:latin typeface="Courier New" panose="02070309020205020404" pitchFamily="49" charset="0"/>
+                <a:cs typeface="Courier New" panose="02070309020205020404" pitchFamily="49" charset="0"/>
+              </a:rPr>
+              <a:t>    </a:t>
+            </a:r>
+            <a:r>
+              <a:rPr lang="en-US" sz="4000" dirty="0" smtClean="0">
+                <a:latin typeface="Courier New" panose="02070309020205020404" pitchFamily="49" charset="0"/>
+                <a:cs typeface="Courier New" panose="02070309020205020404" pitchFamily="49" charset="0"/>
+              </a:rPr>
+              <a:t>print('ok')</a:t>
+            </a:r>
+            <a:endParaRPr lang="fr-FR" sz="4000" dirty="0" smtClean="0">
+              <a:latin typeface="Courier New" panose="02070309020205020404" pitchFamily="49" charset="0"/>
+              <a:cs typeface="Courier New" panose="02070309020205020404" pitchFamily="49" charset="0"/>
+            </a:endParaRPr>
+          </a:p>
+          <a:p>
+            <a:pPr marL="457200" lvl="1" indent="0">
+              <a:buNone/>
+            </a:pPr>
+            <a:r>
+              <a:rPr lang="fr-FR" sz="3600" dirty="0" smtClean="0">
+                <a:cs typeface="Courier New" panose="02070309020205020404" pitchFamily="49" charset="0"/>
+              </a:rPr>
+              <a:t>	</a:t>
+            </a:r>
+          </a:p>
+          <a:p>
+            <a:pPr marL="457200" lvl="1" indent="0">
+              <a:buNone/>
+            </a:pPr>
+            <a:endParaRPr lang="fr-FR" sz="3600" dirty="0" smtClean="0">
+              <a:cs typeface="Courier New" panose="02070309020205020404" pitchFamily="49" charset="0"/>
+            </a:endParaRPr>
+          </a:p>
+        </p:txBody>
+      </p:sp>
+    </p:spTree>
+    <p:extLst>
+      <p:ext uri="{BB962C8B-B14F-4D97-AF65-F5344CB8AC3E}">
+        <p14:creationId xmlns:p14="http://schemas.microsoft.com/office/powerpoint/2010/main" val="3181682277"/>
+      </p:ext>
+    </p:extLst>
+  </p:cSld>
+  <p:clrMapOvr>
+    <a:masterClrMapping/>
+  </p:clrMapOvr>
+  <p:timing>
+    <p:tnLst>
+      <p:par>
+        <p:cTn id="1" dur="indefinite" restart="never" nodeType="tmRoot">
+          <p:childTnLst>
+            <p:seq concurrent="1" nextAc="seek">
+              <p:cTn id="2" dur="indefinite" nodeType="mainSeq">
+                <p:childTnLst>
+                  <p:par>
+                    <p:cTn id="3" fill="hold">
+                      <p:stCondLst>
+                        <p:cond delay="indefinite"/>
+                      </p:stCondLst>
+                      <p:childTnLst>
+                        <p:par>
+                          <p:cTn id="4" fill="hold">
+                            <p:stCondLst>
+                              <p:cond delay="0"/>
+                            </p:stCondLst>
+                            <p:childTnLst>
+                              <p:par>
+                                <p:cTn id="5" presetID="1" presetClass="entr" presetSubtype="0" fill="hold" nodeType="clickEffect">
+                                  <p:stCondLst>
+                                    <p:cond delay="0"/>
+                                  </p:stCondLst>
+                                  <p:iterate type="lt">
+                                    <p:tmAbs val="100"/>
+                                  </p:iterate>
+                                  <p:childTnLst>
+                                    <p:set>
+                                      <p:cBhvr>
+                                        <p:cTn id="6" dur="1" fill="hold">
+                                          <p:stCondLst>
+                                            <p:cond delay="0"/>
+                                          </p:stCondLst>
+                                        </p:cTn>
+                                        <p:tgtEl>
+                                          <p:spTgt spid="3">
+                                            <p:txEl>
+                                              <p:pRg st="4" end="4"/>
+                                            </p:txEl>
+                                          </p:spTgt>
+                                        </p:tgtEl>
+                                        <p:attrNameLst>
+                                          <p:attrName>style.visibility</p:attrName>
+                                        </p:attrNameLst>
+                                      </p:cBhvr>
+                                      <p:to>
+                                        <p:strVal val="visible"/>
+                                      </p:to>
+                                    </p:set>
+                                  </p:childTnLst>
+                                </p:cTn>
+                              </p:par>
+                            </p:childTnLst>
+                          </p:cTn>
+                        </p:par>
+                        <p:par>
+                          <p:cTn id="7" fill="hold">
+                            <p:stCondLst>
+                              <p:cond delay="1301"/>
+                            </p:stCondLst>
+                            <p:childTnLst>
+                              <p:par>
+                                <p:cTn id="8" presetID="1" presetClass="entr" presetSubtype="0" fill="hold" nodeType="afterEffect">
+                                  <p:stCondLst>
+                                    <p:cond delay="0"/>
+                                  </p:stCondLst>
+                                  <p:iterate type="lt">
+                                    <p:tmAbs val="100"/>
+                                  </p:iterate>
+                                  <p:childTnLst>
+                                    <p:set>
+                                      <p:cBhvr>
+                                        <p:cTn id="9" dur="1" fill="hold">
+                                          <p:stCondLst>
+                                            <p:cond delay="0"/>
+                                          </p:stCondLst>
+                                        </p:cTn>
+                                        <p:tgtEl>
+                                          <p:spTgt spid="3">
+                                            <p:txEl>
+                                              <p:pRg st="5" end="5"/>
+                                            </p:txEl>
+                                          </p:spTgt>
+                                        </p:tgtEl>
+                                        <p:attrNameLst>
+                                          <p:attrName>style.visibility</p:attrName>
+                                        </p:attrNameLst>
+                                      </p:cBhvr>
+                                      <p:to>
+                                        <p:strVal val="visible"/>
+                                      </p:to>
+                                    </p:set>
+                                  </p:childTnLst>
+                                </p:cTn>
+                              </p:par>
+                            </p:childTnLst>
+                          </p:cTn>
+                        </p:par>
+                      </p:childTnLst>
+                    </p:cTn>
+                  </p:par>
+                </p:childTnLst>
+              </p:cTn>
+              <p:prevCondLst>
+                <p:cond evt="onPrev" delay="0">
+                  <p:tgtEl>
+                    <p:sldTgt/>
+                  </p:tgtEl>
+                </p:cond>
+              </p:prevCondLst>
+              <p:nextCondLst>
+                <p:cond evt="onNext" delay="0">
+                  <p:tgtEl>
+                    <p:sldTgt/>
+                  </p:tgtEl>
+                </p:cond>
+              </p:nextCondLst>
+            </p:seq>
+          </p:childTnLst>
+        </p:cTn>
+      </p:par>
+    </p:tnLst>
+  </p:timing>
+</p:sld>
+</file>
+
+<file path=ppt/slides/slide6.xml><?xml version="1.0" encoding="utf-8"?>
+<p:sld xmlns:a="http://schemas.openxmlformats.org/drawingml/2006/main" xmlns:r="http://schemas.openxmlformats.org/officeDocument/2006/relationships" xmlns:p="http://schemas.openxmlformats.org/presentationml/2006/main">
+  <p:cSld>
+    <p:spTree>
+      <p:nvGrpSpPr>
+        <p:cNvPr id="1" name=""/>
+        <p:cNvGrpSpPr/>
+        <p:nvPr/>
+      </p:nvGrpSpPr>
+      <p:grpSpPr>
+        <a:xfrm>
+          <a:off x="0" y="0"/>
+          <a:ext cx="0" cy="0"/>
+          <a:chOff x="0" y="0"/>
+          <a:chExt cx="0" cy="0"/>
+        </a:xfrm>
+      </p:grpSpPr>
+      <p:sp>
+        <p:nvSpPr>
+          <p:cNvPr id="3" name="Espace réservé du contenu 2"/>
+          <p:cNvSpPr>
+            <a:spLocks noGrp="1"/>
+          </p:cNvSpPr>
+          <p:nvPr>
+            <p:ph idx="1"/>
+          </p:nvPr>
+        </p:nvSpPr>
+        <p:spPr>
+          <a:xfrm>
+            <a:off x="595745" y="263238"/>
+            <a:ext cx="9434946" cy="5668963"/>
+          </a:xfrm>
+        </p:spPr>
+        <p:txBody>
+          <a:bodyPr/>
+          <a:lstStyle/>
+          <a:p>
+            <a:pPr marL="0" indent="0">
+              <a:buNone/>
+            </a:pPr>
+            <a:r>
+              <a:rPr lang="fr-FR" sz="4400" dirty="0"/>
+              <a:t>Exemple d’expressions</a:t>
+            </a:r>
+          </a:p>
+          <a:p>
+            <a:pPr marL="457200" lvl="1" indent="0">
+              <a:buNone/>
+            </a:pPr>
+            <a:endParaRPr lang="fr-FR" sz="3600" dirty="0" smtClean="0"/>
+          </a:p>
+          <a:p>
+            <a:pPr marL="457200" lvl="1" indent="0">
+              <a:buNone/>
+            </a:pPr>
+            <a:r>
+              <a:rPr lang="fr-FR" sz="4000" dirty="0" smtClean="0">
+                <a:solidFill>
+                  <a:srgbClr val="FF0000"/>
+                </a:solidFill>
+              </a:rPr>
               <a:t>Un retour de fonction </a:t>
             </a:r>
           </a:p>
@@ -7079,31 +7637,13 @@
             </a:pPr>
             <a:r>
               <a:rPr lang="fr-FR" sz="3600" dirty="0" smtClean="0"/>
-              <a:t>Soit un booléen</a:t>
+              <a:t>On évalue l’objet retourné</a:t>
             </a:r>
           </a:p>
           <a:p>
             <a:pPr lvl="2">
               <a:buFont typeface="Arial" panose="020B0604020202020204" pitchFamily="34" charset="0"/>
               <a:buChar char="•"/>
-            </a:pPr>
-            <a:r>
-              <a:rPr lang="fr-FR" sz="3600" dirty="0" smtClean="0"/>
-              <a:t>Soit un type </a:t>
-            </a:r>
-            <a:r>
-              <a:rPr lang="fr-FR" sz="3600" dirty="0" err="1" smtClean="0"/>
-              <a:t>built</a:t>
-            </a:r>
-            <a:r>
-              <a:rPr lang="fr-FR" sz="3600" dirty="0" smtClean="0"/>
-              <a:t>-in</a:t>
-            </a:r>
-            <a:endParaRPr lang="fr-FR" sz="3600" dirty="0"/>
-          </a:p>
-          <a:p>
-            <a:pPr marL="0" indent="0">
-              <a:buNone/>
             </a:pPr>
             <a:endParaRPr lang="en-US" sz="2000" dirty="0" smtClean="0">
               <a:latin typeface="Courier New" panose="02070309020205020404" pitchFamily="49" charset="0"/>
@@ -7284,6 +7824,9 @@
                                   <p:stCondLst>
                                     <p:cond delay="0"/>
                                   </p:stCondLst>
+                                  <p:iterate type="lt">
+                                    <p:tmAbs val="100"/>
+                                  </p:iterate>
                                   <p:childTnLst>
                                     <p:set>
                                       <p:cBhvr>
@@ -7295,7 +7838,7 @@
                                         <p:tgtEl>
                                           <p:spTgt spid="3">
                                             <p:txEl>
-                                              <p:pRg st="4" end="4"/>
+                                              <p:pRg st="5" end="5"/>
                                             </p:txEl>
                                           </p:spTgt>
                                         </p:tgtEl>
@@ -7313,23 +7856,14 @@
                             </p:childTnLst>
                           </p:cTn>
                         </p:par>
-                      </p:childTnLst>
-                    </p:cTn>
-                  </p:par>
-                  <p:par>
-                    <p:cTn id="11" fill="hold">
-                      <p:stCondLst>
-                        <p:cond delay="indefinite"/>
-                      </p:stCondLst>
-                      <p:childTnLst>
                         <p:par>
-                          <p:cTn id="12" fill="hold">
+                          <p:cTn id="11" fill="hold">
                             <p:stCondLst>
-                              <p:cond delay="0"/>
+                              <p:cond delay="601"/>
                             </p:stCondLst>
                             <p:childTnLst>
                               <p:par>
-                                <p:cTn id="13" presetID="1" presetClass="entr" presetSubtype="0" fill="hold" nodeType="clickEffect">
+                                <p:cTn id="12" presetID="1" presetClass="entr" presetSubtype="0" fill="hold" nodeType="afterEffect">
                                   <p:stCondLst>
                                     <p:cond delay="0"/>
                                   </p:stCondLst>
@@ -7339,7 +7873,7 @@
                                   <p:childTnLst>
                                     <p:set>
                                       <p:cBhvr>
-                                        <p:cTn id="14" dur="1" fill="hold">
+                                        <p:cTn id="13" dur="1" fill="hold">
                                           <p:stCondLst>
                                             <p:cond delay="0"/>
                                           </p:stCondLst>
@@ -7366,13 +7900,13 @@
                           </p:cTn>
                         </p:par>
                         <p:par>
-                          <p:cTn id="15" fill="hold">
+                          <p:cTn id="14" fill="hold">
                             <p:stCondLst>
-                              <p:cond delay="601"/>
+                              <p:cond delay="2102"/>
                             </p:stCondLst>
                             <p:childTnLst>
                               <p:par>
-                                <p:cTn id="16" presetID="1" presetClass="entr" presetSubtype="0" fill="hold" nodeType="afterEffect">
+                                <p:cTn id="15" presetID="1" presetClass="entr" presetSubtype="0" fill="hold" nodeType="afterEffect">
                                   <p:stCondLst>
                                     <p:cond delay="0"/>
                                   </p:stCondLst>
@@ -7382,7 +7916,7 @@
                                   <p:childTnLst>
                                     <p:set>
                                       <p:cBhvr>
-                                        <p:cTn id="17" dur="1" fill="hold">
+                                        <p:cTn id="16" dur="1" fill="hold">
                                           <p:stCondLst>
                                             <p:cond delay="0"/>
                                           </p:stCondLst>
@@ -7391,49 +7925,6 @@
                                           <p:spTgt spid="3">
                                             <p:txEl>
                                               <p:pRg st="7" end="7"/>
-                                            </p:txEl>
-                                          </p:spTgt>
-                                        </p:tgtEl>
-                                        <p:attrNameLst>
-                                          <p:attrName>style.visibility</p:attrName>
-                                        </p:attrNameLst>
-                                      </p:cBhvr>
-                                      <p:to>
-                                        <p:strVal val="visible"/>
-                                      </p:to>
-                                    </p:set>
-                                  </p:childTnLst>
-                                </p:cTn>
-                              </p:par>
-                            </p:childTnLst>
-                          </p:cTn>
-                        </p:par>
-                        <p:par>
-                          <p:cTn id="18" fill="hold">
-                            <p:stCondLst>
-                              <p:cond delay="2102"/>
-                            </p:stCondLst>
-                            <p:childTnLst>
-                              <p:par>
-                                <p:cTn id="19" presetID="1" presetClass="entr" presetSubtype="0" fill="hold" nodeType="afterEffect">
-                                  <p:stCondLst>
-                                    <p:cond delay="0"/>
-                                  </p:stCondLst>
-                                  <p:iterate type="lt">
-                                    <p:tmAbs val="100"/>
-                                  </p:iterate>
-                                  <p:childTnLst>
-                                    <p:set>
-                                      <p:cBhvr>
-                                        <p:cTn id="20" dur="1" fill="hold">
-                                          <p:stCondLst>
-                                            <p:cond delay="0"/>
-                                          </p:stCondLst>
-                                        </p:cTn>
-                                        <p:tgtEl>
-                                          <p:spTgt spid="3">
-                                            <p:txEl>
-                                              <p:pRg st="8" end="8"/>
                                             </p:txEl>
                                           </p:spTgt>
                                         </p:tgtEl>
@@ -7479,7 +7970,7 @@
 </p:sld>
 </file>
 
-<file path=ppt/slides/slide6.xml><?xml version="1.0" encoding="utf-8"?>
+<file path=ppt/slides/slide7.xml><?xml version="1.0" encoding="utf-8"?>
 <p:sld xmlns:a="http://schemas.openxmlformats.org/drawingml/2006/main" xmlns:r="http://schemas.openxmlformats.org/officeDocument/2006/relationships" xmlns:p="http://schemas.openxmlformats.org/presentationml/2006/main">
   <p:cSld>
     <p:spTree>
@@ -7521,7 +8012,7 @@
             </a:pPr>
             <a:r>
               <a:rPr lang="fr-FR" sz="4400" dirty="0"/>
-              <a:t>Que peut être un test dans un if ?</a:t>
+              <a:t>Exemple d’expressions</a:t>
             </a:r>
           </a:p>
           <a:p>
@@ -8226,7 +8717,7 @@
 </p:sld>
 </file>
 
-<file path=ppt/slides/slide7.xml><?xml version="1.0" encoding="utf-8"?>
+<file path=ppt/slides/slide8.xml><?xml version="1.0" encoding="utf-8"?>
 <p:sld xmlns:a="http://schemas.openxmlformats.org/drawingml/2006/main" xmlns:r="http://schemas.openxmlformats.org/officeDocument/2006/relationships" xmlns:p="http://schemas.openxmlformats.org/presentationml/2006/main">
   <p:cSld>
     <p:spTree>
@@ -8695,10 +9186,6 @@
               </a:rPr>
               <a:t>)</a:t>
             </a:r>
-            <a:endParaRPr lang="fr-FR" sz="3600" dirty="0">
-              <a:latin typeface="Courier New" panose="02070309020205020404" pitchFamily="49" charset="0"/>
-              <a:cs typeface="Courier New" panose="02070309020205020404" pitchFamily="49" charset="0"/>
-            </a:endParaRPr>
           </a:p>
         </p:txBody>
       </p:sp>
@@ -9207,6 +9694,81 @@
             </p:seq>
           </p:childTnLst>
         </p:cTn>
+      </p:par>
+    </p:tnLst>
+  </p:timing>
+</p:sld>
+</file>
+
+<file path=ppt/slides/slide9.xml><?xml version="1.0" encoding="utf-8"?>
+<p:sld xmlns:a="http://schemas.openxmlformats.org/drawingml/2006/main" xmlns:r="http://schemas.openxmlformats.org/officeDocument/2006/relationships" xmlns:p="http://schemas.openxmlformats.org/presentationml/2006/main">
+  <p:cSld>
+    <p:spTree>
+      <p:nvGrpSpPr>
+        <p:cNvPr id="1" name=""/>
+        <p:cNvGrpSpPr/>
+        <p:nvPr/>
+      </p:nvGrpSpPr>
+      <p:grpSpPr>
+        <a:xfrm>
+          <a:off x="0" y="0"/>
+          <a:ext cx="0" cy="0"/>
+          <a:chOff x="0" y="0"/>
+          <a:chExt cx="0" cy="0"/>
+        </a:xfrm>
+      </p:grpSpPr>
+      <p:sp>
+        <p:nvSpPr>
+          <p:cNvPr id="2" name="Titre 1"/>
+          <p:cNvSpPr>
+            <a:spLocks noGrp="1"/>
+          </p:cNvSpPr>
+          <p:nvPr>
+            <p:ph type="title"/>
+          </p:nvPr>
+        </p:nvSpPr>
+        <p:spPr/>
+        <p:txBody>
+          <a:bodyPr/>
+          <a:lstStyle/>
+          <a:p>
+            <a:endParaRPr lang="fr-FR"/>
+          </a:p>
+        </p:txBody>
+      </p:sp>
+      <p:sp>
+        <p:nvSpPr>
+          <p:cNvPr id="3" name="Espace réservé du contenu 2"/>
+          <p:cNvSpPr>
+            <a:spLocks noGrp="1"/>
+          </p:cNvSpPr>
+          <p:nvPr>
+            <p:ph idx="1"/>
+          </p:nvPr>
+        </p:nvSpPr>
+        <p:spPr/>
+        <p:txBody>
+          <a:bodyPr/>
+          <a:lstStyle/>
+          <a:p>
+            <a:endParaRPr lang="fr-FR"/>
+          </a:p>
+        </p:txBody>
+      </p:sp>
+    </p:spTree>
+    <p:extLst>
+      <p:ext uri="{BB962C8B-B14F-4D97-AF65-F5344CB8AC3E}">
+        <p14:creationId xmlns:p14="http://schemas.microsoft.com/office/powerpoint/2010/main" val="2875087375"/>
+      </p:ext>
+    </p:extLst>
+  </p:cSld>
+  <p:clrMapOvr>
+    <a:masterClrMapping/>
+  </p:clrMapOvr>
+  <p:timing>
+    <p:tnLst>
+      <p:par>
+        <p:cTn id="1" dur="indefinite" restart="never" nodeType="tmRoot"/>
       </p:par>
     </p:tnLst>
   </p:timing>

</xml_diff>

<commit_message>
passe sur la relecture de thierry de w4 bis
</commit_message>
<xml_diff>
--- a/w4/w4-s2-av-slide1.pptx
+++ b/w4/w4-s2-av-slide1.pptx
@@ -593,7 +593,7 @@
           </a:ln>
           <a:extLst>
             <a:ext uri="{909E8E84-426E-40dd-AFC4-6F175D3DCCD1}">
-              <a14:hiddenFill xmlns:a14="http://schemas.microsoft.com/office/drawing/2010/main" xmlns="">
+              <a14:hiddenFill xmlns="" xmlns:a14="http://schemas.microsoft.com/office/drawing/2010/main">
                 <a:solidFill>
                   <a:srgbClr val="FFFFFF"/>
                 </a:solidFill>
@@ -4464,14 +4464,14 @@
           </a:ln>
           <a:extLst>
             <a:ext uri="{909E8E84-426E-40dd-AFC4-6F175D3DCCD1}">
-              <a14:hiddenFill xmlns:a14="http://schemas.microsoft.com/office/drawing/2010/main" xmlns="">
+              <a14:hiddenFill xmlns="" xmlns:a14="http://schemas.microsoft.com/office/drawing/2010/main">
                 <a:solidFill>
                   <a:srgbClr val="FFFFFF"/>
                 </a:solidFill>
               </a14:hiddenFill>
             </a:ext>
             <a:ext uri="{91240B29-F687-4f45-9708-019B960494DF}">
-              <a14:hiddenLine xmlns:a14="http://schemas.microsoft.com/office/drawing/2010/main" xmlns="" w="9525">
+              <a14:hiddenLine xmlns="" xmlns:a14="http://schemas.microsoft.com/office/drawing/2010/main" w="9525">
                 <a:solidFill>
                   <a:srgbClr val="000000"/>
                 </a:solidFill>
@@ -4522,14 +4522,14 @@
           </a:ln>
           <a:extLst>
             <a:ext uri="{909E8E84-426E-40dd-AFC4-6F175D3DCCD1}">
-              <a14:hiddenFill xmlns:a14="http://schemas.microsoft.com/office/drawing/2010/main" xmlns="">
+              <a14:hiddenFill xmlns="" xmlns:a14="http://schemas.microsoft.com/office/drawing/2010/main">
                 <a:solidFill>
                   <a:srgbClr val="FFFFFF"/>
                 </a:solidFill>
               </a14:hiddenFill>
             </a:ext>
             <a:ext uri="{91240B29-F687-4f45-9708-019B960494DF}">
-              <a14:hiddenLine xmlns:a14="http://schemas.microsoft.com/office/drawing/2010/main" xmlns="" w="9525">
+              <a14:hiddenLine xmlns="" xmlns:a14="http://schemas.microsoft.com/office/drawing/2010/main" w="9525">
                 <a:solidFill>
                   <a:srgbClr val="000000"/>
                 </a:solidFill>
@@ -5980,20 +5980,13 @@
                   <a:srgbClr val="FF0000"/>
                 </a:solidFill>
               </a:rPr>
-              <a:t>objet</a:t>
-            </a:r>
-            <a:r>
-              <a:rPr lang="fr-FR" sz="4000" dirty="0" smtClean="0"/>
-              <a:t> ou </a:t>
-            </a:r>
-            <a:r>
-              <a:rPr lang="fr-FR" sz="4000" dirty="0" smtClean="0">
-                <a:solidFill>
-                  <a:srgbClr val="FF0000"/>
-                </a:solidFill>
-              </a:rPr>
               <a:t>expression</a:t>
             </a:r>
+            <a:endParaRPr lang="fr-FR" sz="4000" dirty="0" smtClean="0">
+              <a:solidFill>
+                <a:srgbClr val="FF0000"/>
+              </a:solidFill>
+            </a:endParaRPr>
           </a:p>
           <a:p>
             <a:pPr lvl="1">
@@ -6408,10 +6401,9 @@
               <a:buNone/>
             </a:pPr>
             <a:r>
-              <a:rPr lang="fr-FR" sz="4400" dirty="0" smtClean="0"/>
-              <a:t>Exemple d’objets</a:t>
-            </a:r>
-            <a:endParaRPr lang="fr-FR" sz="4400" dirty="0"/>
+              <a:rPr lang="fr-FR" sz="4400" dirty="0"/>
+              <a:t>Exemple d’expressions</a:t>
+            </a:r>
           </a:p>
           <a:p>
             <a:pPr lvl="1">
@@ -6903,7 +6895,6 @@
               <a:rPr lang="fr-FR" sz="4400" dirty="0" smtClean="0"/>
               <a:t>Exemple d’expressions</a:t>
             </a:r>
-            <a:endParaRPr lang="fr-FR" sz="4400" dirty="0" smtClean="0"/>
           </a:p>
           <a:p>
             <a:pPr lvl="1">

</xml_diff>

<commit_message>
fixed a slide typo
</commit_message>
<xml_diff>
--- a/w4/w4-s2-av-slide1.pptx
+++ b/w4/w4-s2-av-slide1.pptx
@@ -593,7 +593,7 @@
           </a:ln>
           <a:extLst>
             <a:ext uri="{909E8E84-426E-40dd-AFC4-6F175D3DCCD1}">
-              <a14:hiddenFill xmlns="" xmlns:a14="http://schemas.microsoft.com/office/drawing/2010/main">
+              <a14:hiddenFill xmlns:a14="http://schemas.microsoft.com/office/drawing/2010/main" xmlns="">
                 <a:solidFill>
                   <a:srgbClr val="FFFFFF"/>
                 </a:solidFill>
@@ -4464,14 +4464,14 @@
           </a:ln>
           <a:extLst>
             <a:ext uri="{909E8E84-426E-40dd-AFC4-6F175D3DCCD1}">
-              <a14:hiddenFill xmlns="" xmlns:a14="http://schemas.microsoft.com/office/drawing/2010/main">
+              <a14:hiddenFill xmlns:a14="http://schemas.microsoft.com/office/drawing/2010/main" xmlns="">
                 <a:solidFill>
                   <a:srgbClr val="FFFFFF"/>
                 </a:solidFill>
               </a14:hiddenFill>
             </a:ext>
             <a:ext uri="{91240B29-F687-4f45-9708-019B960494DF}">
-              <a14:hiddenLine xmlns="" xmlns:a14="http://schemas.microsoft.com/office/drawing/2010/main" w="9525">
+              <a14:hiddenLine xmlns:a14="http://schemas.microsoft.com/office/drawing/2010/main" xmlns="" w="9525">
                 <a:solidFill>
                   <a:srgbClr val="000000"/>
                 </a:solidFill>
@@ -4522,14 +4522,14 @@
           </a:ln>
           <a:extLst>
             <a:ext uri="{909E8E84-426E-40dd-AFC4-6F175D3DCCD1}">
-              <a14:hiddenFill xmlns="" xmlns:a14="http://schemas.microsoft.com/office/drawing/2010/main">
+              <a14:hiddenFill xmlns:a14="http://schemas.microsoft.com/office/drawing/2010/main" xmlns="">
                 <a:solidFill>
                   <a:srgbClr val="FFFFFF"/>
                 </a:solidFill>
               </a14:hiddenFill>
             </a:ext>
             <a:ext uri="{91240B29-F687-4f45-9708-019B960494DF}">
-              <a14:hiddenLine xmlns="" xmlns:a14="http://schemas.microsoft.com/office/drawing/2010/main" w="9525">
+              <a14:hiddenLine xmlns:a14="http://schemas.microsoft.com/office/drawing/2010/main" xmlns="" w="9525">
                 <a:solidFill>
                   <a:srgbClr val="000000"/>
                 </a:solidFill>
@@ -5972,7 +5972,11 @@
             </a:pPr>
             <a:r>
               <a:rPr lang="fr-FR" sz="4000" dirty="0" smtClean="0"/>
-              <a:t>N’importe quel </a:t>
+              <a:t>N’importe </a:t>
+            </a:r>
+            <a:r>
+              <a:rPr lang="fr-FR" sz="4000" dirty="0" smtClean="0"/>
+              <a:t>quelle </a:t>
             </a:r>
             <a:r>
               <a:rPr lang="fr-FR" sz="4000" dirty="0" smtClean="0">
@@ -5982,11 +5986,6 @@
               </a:rPr>
               <a:t>expression</a:t>
             </a:r>
-            <a:endParaRPr lang="fr-FR" sz="4000" dirty="0" smtClean="0">
-              <a:solidFill>
-                <a:srgbClr val="FF0000"/>
-              </a:solidFill>
-            </a:endParaRPr>
           </a:p>
           <a:p>
             <a:pPr lvl="1">

</xml_diff>